<commit_message>
First commit after finalizing the pilots.
</commit_message>
<xml_diff>
--- a/knapsack/static/knapsack/media/Contest Progress Diagram 20% Infeasibility.pptx
+++ b/knapsack/static/knapsack/media/Contest Progress Diagram 20% Infeasibility.pptx
@@ -112,6 +112,10 @@
 </p:presentation>
 </file>
 
+<file path=ppt/revisionInfo.xml><?xml version="1.0" encoding="utf-8"?>
+<p1510:revInfo xmlns:a="http://schemas.openxmlformats.org/drawingml/2006/main" xmlns:r="http://schemas.openxmlformats.org/officeDocument/2006/relationships" xmlns:p1510="http://schemas.microsoft.com/office/powerpoint/2015/10/main"/>
+</file>
+
 <file path=ppt/slideLayouts/slideLayout1.xml><?xml version="1.0" encoding="utf-8"?>
 <p:sldLayout xmlns:a="http://schemas.openxmlformats.org/drawingml/2006/main" xmlns:r="http://schemas.openxmlformats.org/officeDocument/2006/relationships" xmlns:p="http://schemas.openxmlformats.org/presentationml/2006/main" type="title" preserve="1">
   <p:cSld name="Title Slide">
@@ -241,7 +245,7 @@
           <a:p>
             <a:fld id="{E421A8CA-A433-49D5-BE79-7B5490FAC30B}" type="datetimeFigureOut">
               <a:rPr lang="en-US" smtClean="0"/>
-              <a:t>3/2/2017</a:t>
+              <a:t>6/15/2017</a:t>
             </a:fld>
             <a:endParaRPr lang="en-US"/>
           </a:p>
@@ -409,7 +413,7 @@
           <a:p>
             <a:fld id="{E421A8CA-A433-49D5-BE79-7B5490FAC30B}" type="datetimeFigureOut">
               <a:rPr lang="en-US" smtClean="0"/>
-              <a:t>3/2/2017</a:t>
+              <a:t>6/15/2017</a:t>
             </a:fld>
             <a:endParaRPr lang="en-US"/>
           </a:p>
@@ -587,7 +591,7 @@
           <a:p>
             <a:fld id="{E421A8CA-A433-49D5-BE79-7B5490FAC30B}" type="datetimeFigureOut">
               <a:rPr lang="en-US" smtClean="0"/>
-              <a:t>3/2/2017</a:t>
+              <a:t>6/15/2017</a:t>
             </a:fld>
             <a:endParaRPr lang="en-US"/>
           </a:p>
@@ -755,7 +759,7 @@
           <a:p>
             <a:fld id="{E421A8CA-A433-49D5-BE79-7B5490FAC30B}" type="datetimeFigureOut">
               <a:rPr lang="en-US" smtClean="0"/>
-              <a:t>3/2/2017</a:t>
+              <a:t>6/15/2017</a:t>
             </a:fld>
             <a:endParaRPr lang="en-US"/>
           </a:p>
@@ -1000,7 +1004,7 @@
           <a:p>
             <a:fld id="{E421A8CA-A433-49D5-BE79-7B5490FAC30B}" type="datetimeFigureOut">
               <a:rPr lang="en-US" smtClean="0"/>
-              <a:t>3/2/2017</a:t>
+              <a:t>6/15/2017</a:t>
             </a:fld>
             <a:endParaRPr lang="en-US"/>
           </a:p>
@@ -1229,7 +1233,7 @@
           <a:p>
             <a:fld id="{E421A8CA-A433-49D5-BE79-7B5490FAC30B}" type="datetimeFigureOut">
               <a:rPr lang="en-US" smtClean="0"/>
-              <a:t>3/2/2017</a:t>
+              <a:t>6/15/2017</a:t>
             </a:fld>
             <a:endParaRPr lang="en-US"/>
           </a:p>
@@ -1593,7 +1597,7 @@
           <a:p>
             <a:fld id="{E421A8CA-A433-49D5-BE79-7B5490FAC30B}" type="datetimeFigureOut">
               <a:rPr lang="en-US" smtClean="0"/>
-              <a:t>3/2/2017</a:t>
+              <a:t>6/15/2017</a:t>
             </a:fld>
             <a:endParaRPr lang="en-US"/>
           </a:p>
@@ -1710,7 +1714,7 @@
           <a:p>
             <a:fld id="{E421A8CA-A433-49D5-BE79-7B5490FAC30B}" type="datetimeFigureOut">
               <a:rPr lang="en-US" smtClean="0"/>
-              <a:t>3/2/2017</a:t>
+              <a:t>6/15/2017</a:t>
             </a:fld>
             <a:endParaRPr lang="en-US"/>
           </a:p>
@@ -1805,7 +1809,7 @@
           <a:p>
             <a:fld id="{E421A8CA-A433-49D5-BE79-7B5490FAC30B}" type="datetimeFigureOut">
               <a:rPr lang="en-US" smtClean="0"/>
-              <a:t>3/2/2017</a:t>
+              <a:t>6/15/2017</a:t>
             </a:fld>
             <a:endParaRPr lang="en-US"/>
           </a:p>
@@ -2080,7 +2084,7 @@
           <a:p>
             <a:fld id="{E421A8CA-A433-49D5-BE79-7B5490FAC30B}" type="datetimeFigureOut">
               <a:rPr lang="en-US" smtClean="0"/>
-              <a:t>3/2/2017</a:t>
+              <a:t>6/15/2017</a:t>
             </a:fld>
             <a:endParaRPr lang="en-US"/>
           </a:p>
@@ -2332,7 +2336,7 @@
           <a:p>
             <a:fld id="{E421A8CA-A433-49D5-BE79-7B5490FAC30B}" type="datetimeFigureOut">
               <a:rPr lang="en-US" smtClean="0"/>
-              <a:t>3/2/2017</a:t>
+              <a:t>6/15/2017</a:t>
             </a:fld>
             <a:endParaRPr lang="en-US"/>
           </a:p>
@@ -2548,7 +2552,7 @@
           <a:p>
             <a:fld id="{E421A8CA-A433-49D5-BE79-7B5490FAC30B}" type="datetimeFigureOut">
               <a:rPr lang="en-US" smtClean="0"/>
-              <a:t>3/2/2017</a:t>
+              <a:t>6/15/2017</a:t>
             </a:fld>
             <a:endParaRPr lang="en-US"/>
           </a:p>
@@ -3004,7 +3008,7 @@
             <a:pPr algn="ctr"/>
             <a:r>
               <a:rPr lang="en-US" sz="2800"/>
-              <a:t>40</a:t>
+              <a:t>20</a:t>
             </a:r>
             <a:r>
               <a:rPr lang="en-US" sz="2800" dirty="0"/>
@@ -3208,7 +3212,7 @@
                   <a:srgbClr val="FFC000"/>
                 </a:solidFill>
               </a:rPr>
-              <a:t>&amp; Earn $4.0 </a:t>
+              <a:t>&amp; Earn $5.0 </a:t>
             </a:r>
             <a:endParaRPr lang="en-US" sz="4000" b="1" cap="none" spc="0" dirty="0">
               <a:ln/>

</xml_diff>